<commit_message>
Fix exit quiz sequence diagram arrow color
</commit_message>
<xml_diff>
--- a/docs/diagrams/ExitQuizSequenceDiagram.pptx
+++ b/docs/diagrams/ExitQuizSequenceDiagram.pptx
@@ -6800,8 +6800,8 @@
           </a:prstGeom>
           <a:ln w="19050">
             <a:solidFill>
-              <a:schemeClr val="accent3">
-                <a:lumMod val="50000"/>
+              <a:schemeClr val="accent6">
+                <a:lumMod val="75000"/>
               </a:schemeClr>
             </a:solidFill>
             <a:prstDash val="sysDash"/>

</xml_diff>